<commit_message>
Update WDS trainer presentation - Line-of-business application migration.pptx
</commit_message>
<xml_diff>
--- a/03-CAF Migrate - LoB Migration/CAF-Migrate-WDS/WDS trainer presentation - Line-of-business application migration.pptx
+++ b/03-CAF Migrate - LoB Migration/CAF-Migrate-WDS/WDS trainer presentation - Line-of-business application migration.pptx
@@ -233,7 +233,7 @@
           <a:p>
             <a:fld id="{52A13B17-C506-4D51-BB37-16B365906619}" type="datetimeFigureOut">
               <a:rPr lang="en-US" smtClean="0"/>
-              <a:t>29-Mar-22</a:t>
+              <a:t>10/29/2021</a:t>
             </a:fld>
             <a:endParaRPr lang="en-US" dirty="0"/>
           </a:p>
@@ -1543,7 +1543,7 @@
           <a:p>
             <a:fld id="{386CE63F-9E7F-4C04-9D0D-FCA25A8E9E86}" type="datetime8">
               <a:rPr lang="en-US" smtClean="0"/>
-              <a:t>29-Mar-22 3:46 PM</a:t>
+              <a:t>10/29/2021 3:22 PM</a:t>
             </a:fld>
             <a:endParaRPr lang="en-US" dirty="0"/>
           </a:p>
@@ -1795,7 +1795,7 @@
           <a:p>
             <a:fld id="{386CE63F-9E7F-4C04-9D0D-FCA25A8E9E86}" type="datetime8">
               <a:rPr lang="en-US" smtClean="0"/>
-              <a:t>29-Mar-22 3:46 PM</a:t>
+              <a:t>10/29/2021 3:22 PM</a:t>
             </a:fld>
             <a:endParaRPr lang="en-US" dirty="0"/>
           </a:p>
@@ -1972,7 +1972,7 @@
           <a:p>
             <a:fld id="{386CE63F-9E7F-4C04-9D0D-FCA25A8E9E86}" type="datetime8">
               <a:rPr lang="en-US" smtClean="0"/>
-              <a:t>29-Mar-22 3:46 PM</a:t>
+              <a:t>10/29/2021 3:22 PM</a:t>
             </a:fld>
             <a:endParaRPr lang="en-US" dirty="0"/>
           </a:p>
@@ -2140,7 +2140,7 @@
           <a:p>
             <a:fld id="{386CE63F-9E7F-4C04-9D0D-FCA25A8E9E86}" type="datetime8">
               <a:rPr lang="en-US" smtClean="0"/>
-              <a:t>29-Mar-22 3:46 PM</a:t>
+              <a:t>10/29/2021 3:22 PM</a:t>
             </a:fld>
             <a:endParaRPr lang="en-US" dirty="0"/>
           </a:p>
@@ -2317,7 +2317,7 @@
           <a:p>
             <a:fld id="{386CE63F-9E7F-4C04-9D0D-FCA25A8E9E86}" type="datetime8">
               <a:rPr lang="en-US" smtClean="0"/>
-              <a:t>29-Mar-22 3:46 PM</a:t>
+              <a:t>10/29/2021 3:22 PM</a:t>
             </a:fld>
             <a:endParaRPr lang="en-US" dirty="0"/>
           </a:p>
@@ -2494,7 +2494,7 @@
           <a:p>
             <a:fld id="{386CE63F-9E7F-4C04-9D0D-FCA25A8E9E86}" type="datetime8">
               <a:rPr lang="en-US" smtClean="0"/>
-              <a:t>29-Mar-22 3:46 PM</a:t>
+              <a:t>10/29/2021 3:22 PM</a:t>
             </a:fld>
             <a:endParaRPr lang="en-US" dirty="0"/>
           </a:p>
@@ -2671,7 +2671,7 @@
           <a:p>
             <a:fld id="{386CE63F-9E7F-4C04-9D0D-FCA25A8E9E86}" type="datetime8">
               <a:rPr lang="en-US" smtClean="0"/>
-              <a:t>29-Mar-22 3:46 PM</a:t>
+              <a:t>10/29/2021 3:22 PM</a:t>
             </a:fld>
             <a:endParaRPr lang="en-US" dirty="0"/>
           </a:p>
@@ -5486,7 +5486,7 @@
                   <a:prstClr val="black"/>
                 </a:solidFill>
               </a:rPr>
-              <a:t>29-Mar-22 3:46 PM</a:t>
+              <a:t>10/29/2021 3:22 PM</a:t>
             </a:fld>
             <a:endParaRPr lang="en-US" dirty="0">
               <a:solidFill>
@@ -18523,6 +18523,36 @@
           </a:p>
         </p:txBody>
       </p:sp>
+      <p:sp>
+        <p:nvSpPr>
+          <p:cNvPr id="3" name="Text Placeholder 2">
+            <a:extLst>
+              <a:ext uri="{FF2B5EF4-FFF2-40B4-BE49-F238E27FC236}">
+                <a16:creationId xmlns:a16="http://schemas.microsoft.com/office/drawing/2014/main" id="{C83DC502-2B62-4F9B-A8B3-D2EF25BCD06C}"/>
+              </a:ext>
+            </a:extLst>
+          </p:cNvPr>
+          <p:cNvSpPr>
+            <a:spLocks noGrp="1"/>
+          </p:cNvSpPr>
+          <p:nvPr>
+            <p:ph type="body" sz="quarter" idx="12"/>
+          </p:nvPr>
+        </p:nvSpPr>
+        <p:spPr>
+          <a:xfrm>
+            <a:off x="269301" y="3878574"/>
+            <a:ext cx="7171337" cy="1792326"/>
+          </a:xfrm>
+        </p:spPr>
+        <p:txBody>
+          <a:bodyPr/>
+          <a:lstStyle/>
+          <a:p>
+            <a:endParaRPr lang="en-US" dirty="0"/>
+          </a:p>
+        </p:txBody>
+      </p:sp>
     </p:spTree>
     <p:extLst>
       <p:ext uri="{BB962C8B-B14F-4D97-AF65-F5344CB8AC3E}">
@@ -26440,10 +26470,4 @@
     </a:ext>
   </a:extLst>
 </a:theme>
-</file>
-
-<file path=docMetadata/LabelInfo.xml><?xml version="1.0" encoding="utf-8"?>
-<clbl:labelList xmlns:clbl="http://schemas.microsoft.com/office/2020/mipLabelMetadata">
-  <clbl:label id="{f42aa342-8706-4288-bd11-ebb85995028c}" enabled="1" method="Standard" siteId="{72f988bf-86f1-41af-91ab-2d7cd011db47}" removed="0"/>
-</clbl:labelList>
 </file>
</xml_diff>

<commit_message>
updates to challenges 2-4
</commit_message>
<xml_diff>
--- a/03-CAF Migrate - LoB Migration/CAF-Migrate-WDS/WDS trainer presentation - Line-of-business application migration.pptx
+++ b/03-CAF Migrate - LoB Migration/CAF-Migrate-WDS/WDS trainer presentation - Line-of-business application migration.pptx
@@ -26470,4 +26470,10 @@
     </a:ext>
   </a:extLst>
 </a:theme>
+</file>
+
+<file path=docMetadata/LabelInfo.xml><?xml version="1.0" encoding="utf-8"?>
+<clbl:labelList xmlns:clbl="http://schemas.microsoft.com/office/2020/mipLabelMetadata">
+  <clbl:label id="{f42aa342-8706-4288-bd11-ebb85995028c}" enabled="1" method="Standard" siteId="{72f988bf-86f1-41af-91ab-2d7cd011db47}" removed="0"/>
+</clbl:labelList>
 </file>
</xml_diff>